<commit_message>
Polished up Overview and Tenant User after renaming terminology
</commit_message>
<xml_diff>
--- a/DocSources/images/tenantuser.pptx
+++ b/DocSources/images/tenantuser.pptx
@@ -104,6 +104,11 @@
       </a:defRPr>
     </a:lvl9pPr>
   </p:defaultTextStyle>
+  <p:extLst>
+    <p:ext uri="{EFAFB233-063F-42B5-8137-9DF3F51BA10A}">
+      <p15:sldGuideLst xmlns:p15="http://schemas.microsoft.com/office/powerpoint/2012/main"/>
+    </p:ext>
+  </p:extLst>
 </p:presentation>
 </file>
 
@@ -238,7 +243,7 @@
           <a:p>
             <a:fld id="{F0DEE4FE-D66D-43D5-8C7A-01E070916668}" type="datetimeFigureOut">
               <a:rPr lang="en-US" smtClean="0"/>
-              <a:t>4/19/2017</a:t>
+              <a:t>4/25/2017</a:t>
             </a:fld>
             <a:endParaRPr lang="en-US"/>
           </a:p>
@@ -408,7 +413,7 @@
           <a:p>
             <a:fld id="{F0DEE4FE-D66D-43D5-8C7A-01E070916668}" type="datetimeFigureOut">
               <a:rPr lang="en-US" smtClean="0"/>
-              <a:t>4/19/2017</a:t>
+              <a:t>4/25/2017</a:t>
             </a:fld>
             <a:endParaRPr lang="en-US"/>
           </a:p>
@@ -588,7 +593,7 @@
           <a:p>
             <a:fld id="{F0DEE4FE-D66D-43D5-8C7A-01E070916668}" type="datetimeFigureOut">
               <a:rPr lang="en-US" smtClean="0"/>
-              <a:t>4/19/2017</a:t>
+              <a:t>4/25/2017</a:t>
             </a:fld>
             <a:endParaRPr lang="en-US"/>
           </a:p>
@@ -758,7 +763,7 @@
           <a:p>
             <a:fld id="{F0DEE4FE-D66D-43D5-8C7A-01E070916668}" type="datetimeFigureOut">
               <a:rPr lang="en-US" smtClean="0"/>
-              <a:t>4/19/2017</a:t>
+              <a:t>4/25/2017</a:t>
             </a:fld>
             <a:endParaRPr lang="en-US"/>
           </a:p>
@@ -1004,7 +1009,7 @@
           <a:p>
             <a:fld id="{F0DEE4FE-D66D-43D5-8C7A-01E070916668}" type="datetimeFigureOut">
               <a:rPr lang="en-US" smtClean="0"/>
-              <a:t>4/19/2017</a:t>
+              <a:t>4/25/2017</a:t>
             </a:fld>
             <a:endParaRPr lang="en-US"/>
           </a:p>
@@ -1236,7 +1241,7 @@
           <a:p>
             <a:fld id="{F0DEE4FE-D66D-43D5-8C7A-01E070916668}" type="datetimeFigureOut">
               <a:rPr lang="en-US" smtClean="0"/>
-              <a:t>4/19/2017</a:t>
+              <a:t>4/25/2017</a:t>
             </a:fld>
             <a:endParaRPr lang="en-US"/>
           </a:p>
@@ -1603,7 +1608,7 @@
           <a:p>
             <a:fld id="{F0DEE4FE-D66D-43D5-8C7A-01E070916668}" type="datetimeFigureOut">
               <a:rPr lang="en-US" smtClean="0"/>
-              <a:t>4/19/2017</a:t>
+              <a:t>4/25/2017</a:t>
             </a:fld>
             <a:endParaRPr lang="en-US"/>
           </a:p>
@@ -1721,7 +1726,7 @@
           <a:p>
             <a:fld id="{F0DEE4FE-D66D-43D5-8C7A-01E070916668}" type="datetimeFigureOut">
               <a:rPr lang="en-US" smtClean="0"/>
-              <a:t>4/19/2017</a:t>
+              <a:t>4/25/2017</a:t>
             </a:fld>
             <a:endParaRPr lang="en-US"/>
           </a:p>
@@ -1816,7 +1821,7 @@
           <a:p>
             <a:fld id="{F0DEE4FE-D66D-43D5-8C7A-01E070916668}" type="datetimeFigureOut">
               <a:rPr lang="en-US" smtClean="0"/>
-              <a:t>4/19/2017</a:t>
+              <a:t>4/25/2017</a:t>
             </a:fld>
             <a:endParaRPr lang="en-US"/>
           </a:p>
@@ -2093,7 +2098,7 @@
           <a:p>
             <a:fld id="{F0DEE4FE-D66D-43D5-8C7A-01E070916668}" type="datetimeFigureOut">
               <a:rPr lang="en-US" smtClean="0"/>
-              <a:t>4/19/2017</a:t>
+              <a:t>4/25/2017</a:t>
             </a:fld>
             <a:endParaRPr lang="en-US"/>
           </a:p>
@@ -2346,7 +2351,7 @@
           <a:p>
             <a:fld id="{F0DEE4FE-D66D-43D5-8C7A-01E070916668}" type="datetimeFigureOut">
               <a:rPr lang="en-US" smtClean="0"/>
-              <a:t>4/19/2017</a:t>
+              <a:t>4/25/2017</a:t>
             </a:fld>
             <a:endParaRPr lang="en-US"/>
           </a:p>
@@ -2559,7 +2564,7 @@
           <a:p>
             <a:fld id="{F0DEE4FE-D66D-43D5-8C7A-01E070916668}" type="datetimeFigureOut">
               <a:rPr lang="en-US" smtClean="0"/>
-              <a:t>4/19/2017</a:t>
+              <a:t>4/25/2017</a:t>
             </a:fld>
             <a:endParaRPr lang="en-US"/>
           </a:p>
@@ -3205,8 +3210,8 @@
           </p:nvSpPr>
           <p:spPr bwMode="auto">
             <a:xfrm>
-              <a:off x="4860032" y="2636912"/>
-              <a:ext cx="1440160" cy="261764"/>
+              <a:off x="4932040" y="2636912"/>
+              <a:ext cx="1224136" cy="261764"/>
             </a:xfrm>
             <a:prstGeom prst="rect">
               <a:avLst/>

</xml_diff>